<commit_message>
Changed Title of the TTP to "Victim Targeting: Customer PII and Financial Data". The previous title too tightly coupled the TTP to that specific Campaign losing its effectiveness as a TTP abstraction of victim targeting that could be shared by other Campaigns and Threat Actors.
</commit_message>
<xml_diff>
--- a/idioms/campaign/victim-targeting/diagram.pptx
+++ b/idioms/campaign/victim-targeting/diagram.pptx
@@ -288,7 +288,7 @@
           <a:p>
             <a:fld id="{13F24B86-36D2-4655-BE2F-98B661AC85E1}" type="datetimeFigureOut">
               <a:rPr lang="en-US" smtClean="0"/>
-              <a:t>3/19/2014</a:t>
+              <a:t>3/30/14</a:t>
             </a:fld>
             <a:endParaRPr lang="en-US"/>
           </a:p>
@@ -458,7 +458,7 @@
           <a:p>
             <a:fld id="{13F24B86-36D2-4655-BE2F-98B661AC85E1}" type="datetimeFigureOut">
               <a:rPr lang="en-US" smtClean="0"/>
-              <a:t>3/19/2014</a:t>
+              <a:t>3/30/14</a:t>
             </a:fld>
             <a:endParaRPr lang="en-US"/>
           </a:p>
@@ -638,7 +638,7 @@
           <a:p>
             <a:fld id="{13F24B86-36D2-4655-BE2F-98B661AC85E1}" type="datetimeFigureOut">
               <a:rPr lang="en-US" smtClean="0"/>
-              <a:t>3/19/2014</a:t>
+              <a:t>3/30/14</a:t>
             </a:fld>
             <a:endParaRPr lang="en-US"/>
           </a:p>
@@ -808,7 +808,7 @@
           <a:p>
             <a:fld id="{13F24B86-36D2-4655-BE2F-98B661AC85E1}" type="datetimeFigureOut">
               <a:rPr lang="en-US" smtClean="0"/>
-              <a:t>3/19/2014</a:t>
+              <a:t>3/30/14</a:t>
             </a:fld>
             <a:endParaRPr lang="en-US"/>
           </a:p>
@@ -1054,7 +1054,7 @@
           <a:p>
             <a:fld id="{13F24B86-36D2-4655-BE2F-98B661AC85E1}" type="datetimeFigureOut">
               <a:rPr lang="en-US" smtClean="0"/>
-              <a:t>3/19/2014</a:t>
+              <a:t>3/30/14</a:t>
             </a:fld>
             <a:endParaRPr lang="en-US"/>
           </a:p>
@@ -1342,7 +1342,7 @@
           <a:p>
             <a:fld id="{13F24B86-36D2-4655-BE2F-98B661AC85E1}" type="datetimeFigureOut">
               <a:rPr lang="en-US" smtClean="0"/>
-              <a:t>3/19/2014</a:t>
+              <a:t>3/30/14</a:t>
             </a:fld>
             <a:endParaRPr lang="en-US"/>
           </a:p>
@@ -1764,7 +1764,7 @@
           <a:p>
             <a:fld id="{13F24B86-36D2-4655-BE2F-98B661AC85E1}" type="datetimeFigureOut">
               <a:rPr lang="en-US" smtClean="0"/>
-              <a:t>3/19/2014</a:t>
+              <a:t>3/30/14</a:t>
             </a:fld>
             <a:endParaRPr lang="en-US"/>
           </a:p>
@@ -1882,7 +1882,7 @@
           <a:p>
             <a:fld id="{13F24B86-36D2-4655-BE2F-98B661AC85E1}" type="datetimeFigureOut">
               <a:rPr lang="en-US" smtClean="0"/>
-              <a:t>3/19/2014</a:t>
+              <a:t>3/30/14</a:t>
             </a:fld>
             <a:endParaRPr lang="en-US"/>
           </a:p>
@@ -1977,7 +1977,7 @@
           <a:p>
             <a:fld id="{13F24B86-36D2-4655-BE2F-98B661AC85E1}" type="datetimeFigureOut">
               <a:rPr lang="en-US" smtClean="0"/>
-              <a:t>3/19/2014</a:t>
+              <a:t>3/30/14</a:t>
             </a:fld>
             <a:endParaRPr lang="en-US"/>
           </a:p>
@@ -2254,7 +2254,7 @@
           <a:p>
             <a:fld id="{13F24B86-36D2-4655-BE2F-98B661AC85E1}" type="datetimeFigureOut">
               <a:rPr lang="en-US" smtClean="0"/>
-              <a:t>3/19/2014</a:t>
+              <a:t>3/30/14</a:t>
             </a:fld>
             <a:endParaRPr lang="en-US"/>
           </a:p>
@@ -2507,7 +2507,7 @@
           <a:p>
             <a:fld id="{13F24B86-36D2-4655-BE2F-98B661AC85E1}" type="datetimeFigureOut">
               <a:rPr lang="en-US" smtClean="0"/>
-              <a:t>3/19/2014</a:t>
+              <a:t>3/30/14</a:t>
             </a:fld>
             <a:endParaRPr lang="en-US"/>
           </a:p>
@@ -2720,7 +2720,7 @@
           <a:p>
             <a:fld id="{13F24B86-36D2-4655-BE2F-98B661AC85E1}" type="datetimeFigureOut">
               <a:rPr lang="en-US" smtClean="0"/>
-              <a:t>3/19/2014</a:t>
+              <a:t>3/30/14</a:t>
             </a:fld>
             <a:endParaRPr lang="en-US"/>
           </a:p>
@@ -3104,7 +3104,7 @@
           <p:nvPr>
             <p:extLst>
               <p:ext uri="{D42A27DB-BD31-4B8C-83A1-F6EECF244321}">
-                <p14:modId xmlns:p14="http://schemas.microsoft.com/office/powerpoint/2010/main" val="1875242170"/>
+                <p14:modId xmlns:p14="http://schemas.microsoft.com/office/powerpoint/2010/main" val="4152660183"/>
               </p:ext>
             </p:extLst>
           </p:nvPr>
@@ -3657,7 +3657,7 @@
           <p:nvPr>
             <p:extLst>
               <p:ext uri="{D42A27DB-BD31-4B8C-83A1-F6EECF244321}">
-                <p14:modId xmlns:p14="http://schemas.microsoft.com/office/powerpoint/2010/main" val="3833087149"/>
+                <p14:modId xmlns:p14="http://schemas.microsoft.com/office/powerpoint/2010/main" val="552749170"/>
               </p:ext>
             </p:extLst>
           </p:nvPr>
@@ -3921,7 +3921,11 @@
                       </a:r>
                       <a:r>
                         <a:rPr lang="en-US" sz="1100" baseline="0" dirty="0" smtClean="0"/>
-                        <a:t> Targeting for Operation Alpha</a:t>
+                        <a:t> </a:t>
+                      </a:r>
+                      <a:r>
+                        <a:rPr lang="en-US" sz="1100" baseline="0" dirty="0" smtClean="0"/>
+                        <a:t>Targeting: Customer PII and Financial Data</a:t>
                       </a:r>
                       <a:endParaRPr lang="en-US" sz="1100" b="0" baseline="0" dirty="0" smtClean="0"/>
                     </a:p>

</xml_diff>